<commit_message>
Update mistakes in UG, DG and PPP
</commit_message>
<xml_diff>
--- a/docs/diagrams/UiComponentClassDiagram.pptx
+++ b/docs/diagrams/UiComponentClassDiagram.pptx
@@ -208,7 +208,7 @@
           <a:p>
             <a:fld id="{F5CC4B3F-88C1-4FFA-B1B6-F41C21DC6924}" type="datetimeFigureOut">
               <a:rPr lang="en-US" smtClean="0"/>
-              <a:t>3/10/19</a:t>
+              <a:t>4/12/19</a:t>
             </a:fld>
             <a:endParaRPr lang="en-US"/>
           </a:p>
@@ -654,7 +654,7 @@
           <a:p>
             <a:fld id="{78C97017-6FC3-485B-9764-EAC9E56C1D49}" type="datetimeFigureOut">
               <a:rPr lang="en-US" smtClean="0"/>
-              <a:t>3/10/19</a:t>
+              <a:t>4/12/19</a:t>
             </a:fld>
             <a:endParaRPr lang="en-US"/>
           </a:p>
@@ -822,7 +822,7 @@
           <a:p>
             <a:fld id="{78C97017-6FC3-485B-9764-EAC9E56C1D49}" type="datetimeFigureOut">
               <a:rPr lang="en-US" smtClean="0"/>
-              <a:t>3/10/19</a:t>
+              <a:t>4/12/19</a:t>
             </a:fld>
             <a:endParaRPr lang="en-US"/>
           </a:p>
@@ -1000,7 +1000,7 @@
           <a:p>
             <a:fld id="{78C97017-6FC3-485B-9764-EAC9E56C1D49}" type="datetimeFigureOut">
               <a:rPr lang="en-US" smtClean="0"/>
-              <a:t>3/10/19</a:t>
+              <a:t>4/12/19</a:t>
             </a:fld>
             <a:endParaRPr lang="en-US"/>
           </a:p>
@@ -1168,7 +1168,7 @@
           <a:p>
             <a:fld id="{78C97017-6FC3-485B-9764-EAC9E56C1D49}" type="datetimeFigureOut">
               <a:rPr lang="en-US" smtClean="0"/>
-              <a:t>3/10/19</a:t>
+              <a:t>4/12/19</a:t>
             </a:fld>
             <a:endParaRPr lang="en-US"/>
           </a:p>
@@ -1413,7 +1413,7 @@
           <a:p>
             <a:fld id="{78C97017-6FC3-485B-9764-EAC9E56C1D49}" type="datetimeFigureOut">
               <a:rPr lang="en-US" smtClean="0"/>
-              <a:t>3/10/19</a:t>
+              <a:t>4/12/19</a:t>
             </a:fld>
             <a:endParaRPr lang="en-US"/>
           </a:p>
@@ -1698,7 +1698,7 @@
           <a:p>
             <a:fld id="{78C97017-6FC3-485B-9764-EAC9E56C1D49}" type="datetimeFigureOut">
               <a:rPr lang="en-US" smtClean="0"/>
-              <a:t>3/10/19</a:t>
+              <a:t>4/12/19</a:t>
             </a:fld>
             <a:endParaRPr lang="en-US"/>
           </a:p>
@@ -2117,7 +2117,7 @@
           <a:p>
             <a:fld id="{78C97017-6FC3-485B-9764-EAC9E56C1D49}" type="datetimeFigureOut">
               <a:rPr lang="en-US" smtClean="0"/>
-              <a:t>3/10/19</a:t>
+              <a:t>4/12/19</a:t>
             </a:fld>
             <a:endParaRPr lang="en-US"/>
           </a:p>
@@ -2234,7 +2234,7 @@
           <a:p>
             <a:fld id="{78C97017-6FC3-485B-9764-EAC9E56C1D49}" type="datetimeFigureOut">
               <a:rPr lang="en-US" smtClean="0"/>
-              <a:t>3/10/19</a:t>
+              <a:t>4/12/19</a:t>
             </a:fld>
             <a:endParaRPr lang="en-US"/>
           </a:p>
@@ -2329,7 +2329,7 @@
           <a:p>
             <a:fld id="{78C97017-6FC3-485B-9764-EAC9E56C1D49}" type="datetimeFigureOut">
               <a:rPr lang="en-US" smtClean="0"/>
-              <a:t>3/10/19</a:t>
+              <a:t>4/12/19</a:t>
             </a:fld>
             <a:endParaRPr lang="en-US"/>
           </a:p>
@@ -2604,7 +2604,7 @@
           <a:p>
             <a:fld id="{78C97017-6FC3-485B-9764-EAC9E56C1D49}" type="datetimeFigureOut">
               <a:rPr lang="en-US" smtClean="0"/>
-              <a:t>3/10/19</a:t>
+              <a:t>4/12/19</a:t>
             </a:fld>
             <a:endParaRPr lang="en-US"/>
           </a:p>
@@ -2856,7 +2856,7 @@
           <a:p>
             <a:fld id="{78C97017-6FC3-485B-9764-EAC9E56C1D49}" type="datetimeFigureOut">
               <a:rPr lang="en-US" smtClean="0"/>
-              <a:t>3/10/19</a:t>
+              <a:t>4/12/19</a:t>
             </a:fld>
             <a:endParaRPr lang="en-US"/>
           </a:p>
@@ -3067,7 +3067,7 @@
           <a:p>
             <a:fld id="{78C97017-6FC3-485B-9764-EAC9E56C1D49}" type="datetimeFigureOut">
               <a:rPr lang="en-US" smtClean="0"/>
-              <a:t>3/10/19</a:t>
+              <a:t>4/12/19</a:t>
             </a:fld>
             <a:endParaRPr lang="en-US"/>
           </a:p>
@@ -4065,7 +4065,7 @@
         </p:nvSpPr>
         <p:spPr>
           <a:xfrm>
-            <a:off x="3841058" y="3555700"/>
+            <a:off x="3886200" y="3555700"/>
             <a:ext cx="1040906" cy="236841"/>
           </a:xfrm>
           <a:prstGeom prst="rect">
@@ -4098,7 +4098,7 @@
           <a:p>
             <a:pPr algn="ctr"/>
             <a:r>
-              <a:rPr lang="en-US" sz="1050" b="1" dirty="0">
+              <a:rPr lang="en-US" sz="1050" b="1" dirty="0" err="1">
                 <a:solidFill>
                   <a:schemeClr val="accent3">
                     <a:lumMod val="75000"/>
@@ -4615,6 +4615,7 @@
         <p:nvCxnSpPr>
           <p:cNvPr id="77" name="Elbow Connector 63"/>
           <p:cNvCxnSpPr>
+            <a:cxnSpLocks/>
             <a:stCxn id="16" idx="3"/>
             <a:endCxn id="37" idx="3"/>
           </p:cNvCxnSpPr>
@@ -4622,8 +4623,8 @@
         </p:nvCxnSpPr>
         <p:spPr>
           <a:xfrm rot="5400000">
-            <a:off x="4176223" y="2318640"/>
-            <a:ext cx="2061222" cy="649740"/>
+            <a:off x="4198794" y="2341211"/>
+            <a:ext cx="2061222" cy="604598"/>
           </a:xfrm>
           <a:prstGeom prst="bentConnector2">
             <a:avLst/>
@@ -5171,8 +5172,8 @@
         </p:nvCxnSpPr>
         <p:spPr>
           <a:xfrm rot="16200000" flipH="1">
-            <a:off x="3456577" y="3289639"/>
-            <a:ext cx="118421" cy="650542"/>
+            <a:off x="3479148" y="3267068"/>
+            <a:ext cx="118421" cy="695684"/>
           </a:xfrm>
           <a:prstGeom prst="bentConnector2">
             <a:avLst/>
@@ -5626,7 +5627,7 @@
           <a:p>
             <a:pPr algn="ctr"/>
             <a:r>
-              <a:rPr lang="en-US" sz="1050" b="1" dirty="0">
+              <a:rPr lang="en-US" sz="1050" b="1" dirty="0" err="1">
                 <a:solidFill>
                   <a:schemeClr val="accent3">
                     <a:lumMod val="75000"/>
@@ -5988,7 +5989,7 @@
           <a:p>
             <a:pPr algn="ctr"/>
             <a:r>
-              <a:rPr lang="en-US" sz="1050" b="1" dirty="0">
+              <a:rPr lang="en-US" sz="1050" b="1" dirty="0" err="1">
                 <a:solidFill>
                   <a:schemeClr val="accent3">
                     <a:lumMod val="75000"/>
@@ -6350,7 +6351,7 @@
           <a:p>
             <a:pPr algn="ctr"/>
             <a:r>
-              <a:rPr lang="en-US" sz="1050" b="1" dirty="0">
+              <a:rPr lang="en-US" sz="1050" b="1" dirty="0" err="1">
                 <a:solidFill>
                   <a:schemeClr val="accent3">
                     <a:lumMod val="75000"/>

</xml_diff>